<commit_message>
Update effective due date
</commit_message>
<xml_diff>
--- a/docs/diagrams/EffectiveDueDate.pptx
+++ b/docs/diagrams/EffectiveDueDate.pptx
@@ -261,7 +261,7 @@
           <a:p>
             <a:fld id="{BF15DC44-6737-FF46-9CC2-CFE1A7A70E82}" type="datetimeFigureOut">
               <a:rPr lang="en-US" smtClean="0"/>
-              <a:t>11/11/18</a:t>
+              <a:t>11/12/18</a:t>
             </a:fld>
             <a:endParaRPr lang="en-US"/>
           </a:p>
@@ -459,7 +459,7 @@
           <a:p>
             <a:fld id="{BF15DC44-6737-FF46-9CC2-CFE1A7A70E82}" type="datetimeFigureOut">
               <a:rPr lang="en-US" smtClean="0"/>
-              <a:t>11/11/18</a:t>
+              <a:t>11/12/18</a:t>
             </a:fld>
             <a:endParaRPr lang="en-US"/>
           </a:p>
@@ -667,7 +667,7 @@
           <a:p>
             <a:fld id="{BF15DC44-6737-FF46-9CC2-CFE1A7A70E82}" type="datetimeFigureOut">
               <a:rPr lang="en-US" smtClean="0"/>
-              <a:t>11/11/18</a:t>
+              <a:t>11/12/18</a:t>
             </a:fld>
             <a:endParaRPr lang="en-US"/>
           </a:p>
@@ -865,7 +865,7 @@
           <a:p>
             <a:fld id="{BF15DC44-6737-FF46-9CC2-CFE1A7A70E82}" type="datetimeFigureOut">
               <a:rPr lang="en-US" smtClean="0"/>
-              <a:t>11/11/18</a:t>
+              <a:t>11/12/18</a:t>
             </a:fld>
             <a:endParaRPr lang="en-US"/>
           </a:p>
@@ -1140,7 +1140,7 @@
           <a:p>
             <a:fld id="{BF15DC44-6737-FF46-9CC2-CFE1A7A70E82}" type="datetimeFigureOut">
               <a:rPr lang="en-US" smtClean="0"/>
-              <a:t>11/11/18</a:t>
+              <a:t>11/12/18</a:t>
             </a:fld>
             <a:endParaRPr lang="en-US"/>
           </a:p>
@@ -1405,7 +1405,7 @@
           <a:p>
             <a:fld id="{BF15DC44-6737-FF46-9CC2-CFE1A7A70E82}" type="datetimeFigureOut">
               <a:rPr lang="en-US" smtClean="0"/>
-              <a:t>11/11/18</a:t>
+              <a:t>11/12/18</a:t>
             </a:fld>
             <a:endParaRPr lang="en-US"/>
           </a:p>
@@ -1817,7 +1817,7 @@
           <a:p>
             <a:fld id="{BF15DC44-6737-FF46-9CC2-CFE1A7A70E82}" type="datetimeFigureOut">
               <a:rPr lang="en-US" smtClean="0"/>
-              <a:t>11/11/18</a:t>
+              <a:t>11/12/18</a:t>
             </a:fld>
             <a:endParaRPr lang="en-US"/>
           </a:p>
@@ -1958,7 +1958,7 @@
           <a:p>
             <a:fld id="{BF15DC44-6737-FF46-9CC2-CFE1A7A70E82}" type="datetimeFigureOut">
               <a:rPr lang="en-US" smtClean="0"/>
-              <a:t>11/11/18</a:t>
+              <a:t>11/12/18</a:t>
             </a:fld>
             <a:endParaRPr lang="en-US"/>
           </a:p>
@@ -2071,7 +2071,7 @@
           <a:p>
             <a:fld id="{BF15DC44-6737-FF46-9CC2-CFE1A7A70E82}" type="datetimeFigureOut">
               <a:rPr lang="en-US" smtClean="0"/>
-              <a:t>11/11/18</a:t>
+              <a:t>11/12/18</a:t>
             </a:fld>
             <a:endParaRPr lang="en-US"/>
           </a:p>
@@ -2382,7 +2382,7 @@
           <a:p>
             <a:fld id="{BF15DC44-6737-FF46-9CC2-CFE1A7A70E82}" type="datetimeFigureOut">
               <a:rPr lang="en-US" smtClean="0"/>
-              <a:t>11/11/18</a:t>
+              <a:t>11/12/18</a:t>
             </a:fld>
             <a:endParaRPr lang="en-US"/>
           </a:p>
@@ -2670,7 +2670,7 @@
           <a:p>
             <a:fld id="{BF15DC44-6737-FF46-9CC2-CFE1A7A70E82}" type="datetimeFigureOut">
               <a:rPr lang="en-US" smtClean="0"/>
-              <a:t>11/11/18</a:t>
+              <a:t>11/12/18</a:t>
             </a:fld>
             <a:endParaRPr lang="en-US"/>
           </a:p>
@@ -2911,7 +2911,7 @@
           <a:p>
             <a:fld id="{BF15DC44-6737-FF46-9CC2-CFE1A7A70E82}" type="datetimeFigureOut">
               <a:rPr lang="en-US" smtClean="0"/>
-              <a:t>11/11/18</a:t>
+              <a:t>11/12/18</a:t>
             </a:fld>
             <a:endParaRPr lang="en-US"/>
           </a:p>
@@ -3342,8 +3342,8 @@
         </p:nvSpPr>
         <p:spPr>
           <a:xfrm>
-            <a:off x="7873458" y="1087495"/>
-            <a:ext cx="1747520" cy="1747520"/>
+            <a:off x="6932785" y="2271718"/>
+            <a:ext cx="741680" cy="741680"/>
           </a:xfrm>
           <a:prstGeom prst="ellipse">
             <a:avLst/>
@@ -3391,8 +3391,8 @@
         </p:nvSpPr>
         <p:spPr>
           <a:xfrm>
-            <a:off x="5084663" y="1087495"/>
-            <a:ext cx="1747520" cy="1747520"/>
+            <a:off x="4923478" y="2271718"/>
+            <a:ext cx="741680" cy="741680"/>
           </a:xfrm>
           <a:prstGeom prst="ellipse">
             <a:avLst/>
@@ -3440,8 +3440,8 @@
         </p:nvSpPr>
         <p:spPr>
           <a:xfrm>
-            <a:off x="2295868" y="1087495"/>
-            <a:ext cx="1747520" cy="1747520"/>
+            <a:off x="3019103" y="2271718"/>
+            <a:ext cx="741680" cy="741680"/>
           </a:xfrm>
           <a:prstGeom prst="ellipse">
             <a:avLst/>
@@ -3490,7 +3490,7 @@
           <p:nvPr>
             <p:extLst>
               <p:ext uri="{D42A27DB-BD31-4B8C-83A1-F6EECF244321}">
-                <p14:modId xmlns:p14="http://schemas.microsoft.com/office/powerpoint/2010/main" val="4023583878"/>
+                <p14:modId xmlns:p14="http://schemas.microsoft.com/office/powerpoint/2010/main" val="3452227247"/>
               </p:ext>
             </p:extLst>
           </p:nvPr>
@@ -3687,153 +3687,6 @@
           <a:chExt cx="0" cy="0"/>
         </a:xfrm>
       </p:grpSpPr>
-      <p:sp>
-        <p:nvSpPr>
-          <p:cNvPr id="4" name="Oval 3">
-            <a:extLst>
-              <a:ext uri="{FF2B5EF4-FFF2-40B4-BE49-F238E27FC236}">
-                <a16:creationId xmlns:a16="http://schemas.microsoft.com/office/drawing/2014/main" id="{BCEE0F75-B735-CC47-9892-6852D644FD29}"/>
-              </a:ext>
-            </a:extLst>
-          </p:cNvPr>
-          <p:cNvSpPr/>
-          <p:nvPr/>
-        </p:nvSpPr>
-        <p:spPr>
-          <a:xfrm>
-            <a:off x="7873458" y="1087495"/>
-            <a:ext cx="1747520" cy="1747520"/>
-          </a:xfrm>
-          <a:prstGeom prst="ellipse">
-            <a:avLst/>
-          </a:prstGeom>
-        </p:spPr>
-        <p:style>
-          <a:lnRef idx="2">
-            <a:schemeClr val="accent1">
-              <a:shade val="50000"/>
-            </a:schemeClr>
-          </a:lnRef>
-          <a:fillRef idx="1">
-            <a:schemeClr val="accent1"/>
-          </a:fillRef>
-          <a:effectRef idx="0">
-            <a:schemeClr val="accent1"/>
-          </a:effectRef>
-          <a:fontRef idx="minor">
-            <a:schemeClr val="lt1"/>
-          </a:fontRef>
-        </p:style>
-        <p:txBody>
-          <a:bodyPr rtlCol="0" anchor="ctr"/>
-          <a:lstStyle/>
-          <a:p>
-            <a:pPr algn="ctr"/>
-            <a:r>
-              <a:rPr lang="en-US" sz="5000" dirty="0"/>
-              <a:t>C</a:t>
-            </a:r>
-          </a:p>
-        </p:txBody>
-      </p:sp>
-      <p:sp>
-        <p:nvSpPr>
-          <p:cNvPr id="5" name="Oval 4">
-            <a:extLst>
-              <a:ext uri="{FF2B5EF4-FFF2-40B4-BE49-F238E27FC236}">
-                <a16:creationId xmlns:a16="http://schemas.microsoft.com/office/drawing/2014/main" id="{F5B87010-0B1F-1C41-9042-40C2D1C00AD7}"/>
-              </a:ext>
-            </a:extLst>
-          </p:cNvPr>
-          <p:cNvSpPr/>
-          <p:nvPr/>
-        </p:nvSpPr>
-        <p:spPr>
-          <a:xfrm>
-            <a:off x="5084663" y="1087495"/>
-            <a:ext cx="1747520" cy="1747520"/>
-          </a:xfrm>
-          <a:prstGeom prst="ellipse">
-            <a:avLst/>
-          </a:prstGeom>
-        </p:spPr>
-        <p:style>
-          <a:lnRef idx="2">
-            <a:schemeClr val="accent1">
-              <a:shade val="50000"/>
-            </a:schemeClr>
-          </a:lnRef>
-          <a:fillRef idx="1">
-            <a:schemeClr val="accent1"/>
-          </a:fillRef>
-          <a:effectRef idx="0">
-            <a:schemeClr val="accent1"/>
-          </a:effectRef>
-          <a:fontRef idx="minor">
-            <a:schemeClr val="lt1"/>
-          </a:fontRef>
-        </p:style>
-        <p:txBody>
-          <a:bodyPr rtlCol="0" anchor="ctr"/>
-          <a:lstStyle/>
-          <a:p>
-            <a:pPr algn="ctr"/>
-            <a:r>
-              <a:rPr lang="en-US" sz="5000" dirty="0"/>
-              <a:t>B</a:t>
-            </a:r>
-          </a:p>
-        </p:txBody>
-      </p:sp>
-      <p:sp>
-        <p:nvSpPr>
-          <p:cNvPr id="6" name="Oval 5">
-            <a:extLst>
-              <a:ext uri="{FF2B5EF4-FFF2-40B4-BE49-F238E27FC236}">
-                <a16:creationId xmlns:a16="http://schemas.microsoft.com/office/drawing/2014/main" id="{58776519-F663-4A45-AFAE-E604148C9EC2}"/>
-              </a:ext>
-            </a:extLst>
-          </p:cNvPr>
-          <p:cNvSpPr/>
-          <p:nvPr/>
-        </p:nvSpPr>
-        <p:spPr>
-          <a:xfrm>
-            <a:off x="2295868" y="1087495"/>
-            <a:ext cx="1747520" cy="1747520"/>
-          </a:xfrm>
-          <a:prstGeom prst="ellipse">
-            <a:avLst/>
-          </a:prstGeom>
-        </p:spPr>
-        <p:style>
-          <a:lnRef idx="2">
-            <a:schemeClr val="accent1">
-              <a:shade val="50000"/>
-            </a:schemeClr>
-          </a:lnRef>
-          <a:fillRef idx="1">
-            <a:schemeClr val="accent1"/>
-          </a:fillRef>
-          <a:effectRef idx="0">
-            <a:schemeClr val="accent1"/>
-          </a:effectRef>
-          <a:fontRef idx="minor">
-            <a:schemeClr val="lt1"/>
-          </a:fontRef>
-        </p:style>
-        <p:txBody>
-          <a:bodyPr rtlCol="0" anchor="ctr"/>
-          <a:lstStyle/>
-          <a:p>
-            <a:pPr algn="ctr"/>
-            <a:r>
-              <a:rPr lang="en-US" sz="5000" dirty="0"/>
-              <a:t>A</a:t>
-            </a:r>
-          </a:p>
-        </p:txBody>
-      </p:sp>
       <p:graphicFrame>
         <p:nvGraphicFramePr>
           <p:cNvPr id="12" name="Table 11">
@@ -3849,7 +3702,7 @@
           <p:nvPr>
             <p:extLst>
               <p:ext uri="{D42A27DB-BD31-4B8C-83A1-F6EECF244321}">
-                <p14:modId xmlns:p14="http://schemas.microsoft.com/office/powerpoint/2010/main" val="1392456540"/>
+                <p14:modId xmlns:p14="http://schemas.microsoft.com/office/powerpoint/2010/main" val="3355855011"/>
               </p:ext>
             </p:extLst>
           </p:nvPr>
@@ -4020,12 +3873,159 @@
           </a:graphicData>
         </a:graphic>
       </p:graphicFrame>
+      <p:sp>
+        <p:nvSpPr>
+          <p:cNvPr id="8" name="Oval 7">
+            <a:extLst>
+              <a:ext uri="{FF2B5EF4-FFF2-40B4-BE49-F238E27FC236}">
+                <a16:creationId xmlns:a16="http://schemas.microsoft.com/office/drawing/2014/main" id="{94374DD9-5C45-E941-8292-1EA58ECE6EE3}"/>
+              </a:ext>
+            </a:extLst>
+          </p:cNvPr>
+          <p:cNvSpPr/>
+          <p:nvPr/>
+        </p:nvSpPr>
+        <p:spPr>
+          <a:xfrm>
+            <a:off x="6932785" y="2271718"/>
+            <a:ext cx="741680" cy="741680"/>
+          </a:xfrm>
+          <a:prstGeom prst="ellipse">
+            <a:avLst/>
+          </a:prstGeom>
+        </p:spPr>
+        <p:style>
+          <a:lnRef idx="2">
+            <a:schemeClr val="accent1">
+              <a:shade val="50000"/>
+            </a:schemeClr>
+          </a:lnRef>
+          <a:fillRef idx="1">
+            <a:schemeClr val="accent1"/>
+          </a:fillRef>
+          <a:effectRef idx="0">
+            <a:schemeClr val="accent1"/>
+          </a:effectRef>
+          <a:fontRef idx="minor">
+            <a:schemeClr val="lt1"/>
+          </a:fontRef>
+        </p:style>
+        <p:txBody>
+          <a:bodyPr rtlCol="0" anchor="ctr"/>
+          <a:lstStyle/>
+          <a:p>
+            <a:pPr algn="ctr"/>
+            <a:r>
+              <a:rPr lang="en-US" sz="5000" dirty="0"/>
+              <a:t>C</a:t>
+            </a:r>
+          </a:p>
+        </p:txBody>
+      </p:sp>
+      <p:sp>
+        <p:nvSpPr>
+          <p:cNvPr id="9" name="Oval 8">
+            <a:extLst>
+              <a:ext uri="{FF2B5EF4-FFF2-40B4-BE49-F238E27FC236}">
+                <a16:creationId xmlns:a16="http://schemas.microsoft.com/office/drawing/2014/main" id="{3F035690-F01E-4845-9F32-FC0CE97CABBA}"/>
+              </a:ext>
+            </a:extLst>
+          </p:cNvPr>
+          <p:cNvSpPr/>
+          <p:nvPr/>
+        </p:nvSpPr>
+        <p:spPr>
+          <a:xfrm>
+            <a:off x="4923478" y="2271718"/>
+            <a:ext cx="741680" cy="741680"/>
+          </a:xfrm>
+          <a:prstGeom prst="ellipse">
+            <a:avLst/>
+          </a:prstGeom>
+        </p:spPr>
+        <p:style>
+          <a:lnRef idx="2">
+            <a:schemeClr val="accent1">
+              <a:shade val="50000"/>
+            </a:schemeClr>
+          </a:lnRef>
+          <a:fillRef idx="1">
+            <a:schemeClr val="accent1"/>
+          </a:fillRef>
+          <a:effectRef idx="0">
+            <a:schemeClr val="accent1"/>
+          </a:effectRef>
+          <a:fontRef idx="minor">
+            <a:schemeClr val="lt1"/>
+          </a:fontRef>
+        </p:style>
+        <p:txBody>
+          <a:bodyPr rtlCol="0" anchor="ctr"/>
+          <a:lstStyle/>
+          <a:p>
+            <a:pPr algn="ctr"/>
+            <a:r>
+              <a:rPr lang="en-US" sz="5000" dirty="0"/>
+              <a:t>B</a:t>
+            </a:r>
+          </a:p>
+        </p:txBody>
+      </p:sp>
+      <p:sp>
+        <p:nvSpPr>
+          <p:cNvPr id="10" name="Oval 9">
+            <a:extLst>
+              <a:ext uri="{FF2B5EF4-FFF2-40B4-BE49-F238E27FC236}">
+                <a16:creationId xmlns:a16="http://schemas.microsoft.com/office/drawing/2014/main" id="{692ED6A9-19EC-B04B-8958-232DA05BC383}"/>
+              </a:ext>
+            </a:extLst>
+          </p:cNvPr>
+          <p:cNvSpPr/>
+          <p:nvPr/>
+        </p:nvSpPr>
+        <p:spPr>
+          <a:xfrm>
+            <a:off x="3019103" y="2271718"/>
+            <a:ext cx="741680" cy="741680"/>
+          </a:xfrm>
+          <a:prstGeom prst="ellipse">
+            <a:avLst/>
+          </a:prstGeom>
+        </p:spPr>
+        <p:style>
+          <a:lnRef idx="2">
+            <a:schemeClr val="accent1">
+              <a:shade val="50000"/>
+            </a:schemeClr>
+          </a:lnRef>
+          <a:fillRef idx="1">
+            <a:schemeClr val="accent1"/>
+          </a:fillRef>
+          <a:effectRef idx="0">
+            <a:schemeClr val="accent1"/>
+          </a:effectRef>
+          <a:fontRef idx="minor">
+            <a:schemeClr val="lt1"/>
+          </a:fontRef>
+        </p:style>
+        <p:txBody>
+          <a:bodyPr rtlCol="0" anchor="ctr"/>
+          <a:lstStyle/>
+          <a:p>
+            <a:pPr algn="ctr"/>
+            <a:r>
+              <a:rPr lang="en-US" sz="5000" dirty="0"/>
+              <a:t>A</a:t>
+            </a:r>
+          </a:p>
+        </p:txBody>
+      </p:sp>
       <p:cxnSp>
         <p:nvCxnSpPr>
-          <p:cNvPr id="7" name="Straight Arrow Connector 6">
-            <a:extLst>
-              <a:ext uri="{FF2B5EF4-FFF2-40B4-BE49-F238E27FC236}">
-                <a16:creationId xmlns:a16="http://schemas.microsoft.com/office/drawing/2014/main" id="{6C980928-1E87-9447-8050-B961C1C9E943}"/>
+          <p:cNvPr id="11" name="Straight Arrow Connector 10">
+            <a:extLst>
+              <a:ext uri="{FF2B5EF4-FFF2-40B4-BE49-F238E27FC236}">
+                <a16:creationId xmlns:a16="http://schemas.microsoft.com/office/drawing/2014/main" id="{FBEB3D52-CE11-B549-BF13-73042D4690CA}"/>
               </a:ext>
             </a:extLst>
           </p:cNvPr>
@@ -4036,7 +4036,7 @@
         </p:nvCxnSpPr>
         <p:spPr>
           <a:xfrm flipH="1">
-            <a:off x="4043388" y="1961255"/>
+            <a:off x="3820743" y="2650803"/>
             <a:ext cx="1023287" cy="0"/>
           </a:xfrm>
           <a:prstGeom prst="straightConnector1">
@@ -4094,197 +4094,6 @@
           <a:chExt cx="0" cy="0"/>
         </a:xfrm>
       </p:grpSpPr>
-      <p:sp>
-        <p:nvSpPr>
-          <p:cNvPr id="4" name="Oval 3">
-            <a:extLst>
-              <a:ext uri="{FF2B5EF4-FFF2-40B4-BE49-F238E27FC236}">
-                <a16:creationId xmlns:a16="http://schemas.microsoft.com/office/drawing/2014/main" id="{BCEE0F75-B735-CC47-9892-6852D644FD29}"/>
-              </a:ext>
-            </a:extLst>
-          </p:cNvPr>
-          <p:cNvSpPr/>
-          <p:nvPr/>
-        </p:nvSpPr>
-        <p:spPr>
-          <a:xfrm>
-            <a:off x="7873458" y="1087495"/>
-            <a:ext cx="1747520" cy="1747520"/>
-          </a:xfrm>
-          <a:prstGeom prst="ellipse">
-            <a:avLst/>
-          </a:prstGeom>
-        </p:spPr>
-        <p:style>
-          <a:lnRef idx="2">
-            <a:schemeClr val="accent1">
-              <a:shade val="50000"/>
-            </a:schemeClr>
-          </a:lnRef>
-          <a:fillRef idx="1">
-            <a:schemeClr val="accent1"/>
-          </a:fillRef>
-          <a:effectRef idx="0">
-            <a:schemeClr val="accent1"/>
-          </a:effectRef>
-          <a:fontRef idx="minor">
-            <a:schemeClr val="lt1"/>
-          </a:fontRef>
-        </p:style>
-        <p:txBody>
-          <a:bodyPr rtlCol="0" anchor="ctr"/>
-          <a:lstStyle/>
-          <a:p>
-            <a:pPr algn="ctr"/>
-            <a:r>
-              <a:rPr lang="en-US" sz="5000" dirty="0"/>
-              <a:t>C</a:t>
-            </a:r>
-          </a:p>
-        </p:txBody>
-      </p:sp>
-      <p:sp>
-        <p:nvSpPr>
-          <p:cNvPr id="5" name="Oval 4">
-            <a:extLst>
-              <a:ext uri="{FF2B5EF4-FFF2-40B4-BE49-F238E27FC236}">
-                <a16:creationId xmlns:a16="http://schemas.microsoft.com/office/drawing/2014/main" id="{F5B87010-0B1F-1C41-9042-40C2D1C00AD7}"/>
-              </a:ext>
-            </a:extLst>
-          </p:cNvPr>
-          <p:cNvSpPr/>
-          <p:nvPr/>
-        </p:nvSpPr>
-        <p:spPr>
-          <a:xfrm>
-            <a:off x="5084663" y="1087495"/>
-            <a:ext cx="1747520" cy="1747520"/>
-          </a:xfrm>
-          <a:prstGeom prst="ellipse">
-            <a:avLst/>
-          </a:prstGeom>
-        </p:spPr>
-        <p:style>
-          <a:lnRef idx="2">
-            <a:schemeClr val="accent1">
-              <a:shade val="50000"/>
-            </a:schemeClr>
-          </a:lnRef>
-          <a:fillRef idx="1">
-            <a:schemeClr val="accent1"/>
-          </a:fillRef>
-          <a:effectRef idx="0">
-            <a:schemeClr val="accent1"/>
-          </a:effectRef>
-          <a:fontRef idx="minor">
-            <a:schemeClr val="lt1"/>
-          </a:fontRef>
-        </p:style>
-        <p:txBody>
-          <a:bodyPr rtlCol="0" anchor="ctr"/>
-          <a:lstStyle/>
-          <a:p>
-            <a:pPr algn="ctr"/>
-            <a:r>
-              <a:rPr lang="en-US" sz="5000" dirty="0"/>
-              <a:t>B</a:t>
-            </a:r>
-          </a:p>
-        </p:txBody>
-      </p:sp>
-      <p:sp>
-        <p:nvSpPr>
-          <p:cNvPr id="6" name="Oval 5">
-            <a:extLst>
-              <a:ext uri="{FF2B5EF4-FFF2-40B4-BE49-F238E27FC236}">
-                <a16:creationId xmlns:a16="http://schemas.microsoft.com/office/drawing/2014/main" id="{58776519-F663-4A45-AFAE-E604148C9EC2}"/>
-              </a:ext>
-            </a:extLst>
-          </p:cNvPr>
-          <p:cNvSpPr/>
-          <p:nvPr/>
-        </p:nvSpPr>
-        <p:spPr>
-          <a:xfrm>
-            <a:off x="2295868" y="1087495"/>
-            <a:ext cx="1747520" cy="1747520"/>
-          </a:xfrm>
-          <a:prstGeom prst="ellipse">
-            <a:avLst/>
-          </a:prstGeom>
-        </p:spPr>
-        <p:style>
-          <a:lnRef idx="2">
-            <a:schemeClr val="accent1">
-              <a:shade val="50000"/>
-            </a:schemeClr>
-          </a:lnRef>
-          <a:fillRef idx="1">
-            <a:schemeClr val="accent1"/>
-          </a:fillRef>
-          <a:effectRef idx="0">
-            <a:schemeClr val="accent1"/>
-          </a:effectRef>
-          <a:fontRef idx="minor">
-            <a:schemeClr val="lt1"/>
-          </a:fontRef>
-        </p:style>
-        <p:txBody>
-          <a:bodyPr rtlCol="0" anchor="ctr"/>
-          <a:lstStyle/>
-          <a:p>
-            <a:pPr algn="ctr"/>
-            <a:r>
-              <a:rPr lang="en-US" sz="5000" dirty="0"/>
-              <a:t>A</a:t>
-            </a:r>
-          </a:p>
-        </p:txBody>
-      </p:sp>
-      <p:cxnSp>
-        <p:nvCxnSpPr>
-          <p:cNvPr id="7" name="Straight Arrow Connector 6">
-            <a:extLst>
-              <a:ext uri="{FF2B5EF4-FFF2-40B4-BE49-F238E27FC236}">
-                <a16:creationId xmlns:a16="http://schemas.microsoft.com/office/drawing/2014/main" id="{29E8B00E-F70A-0642-BD23-34115DEC4533}"/>
-              </a:ext>
-            </a:extLst>
-          </p:cNvPr>
-          <p:cNvCxnSpPr>
-            <a:cxnSpLocks/>
-          </p:cNvCxnSpPr>
-          <p:nvPr/>
-        </p:nvCxnSpPr>
-        <p:spPr>
-          <a:xfrm flipH="1">
-            <a:off x="4043388" y="1961255"/>
-            <a:ext cx="1023287" cy="0"/>
-          </a:xfrm>
-          <a:prstGeom prst="straightConnector1">
-            <a:avLst/>
-          </a:prstGeom>
-          <a:ln w="190500">
-            <a:solidFill>
-              <a:schemeClr val="accent4"/>
-            </a:solidFill>
-            <a:tailEnd type="triangle"/>
-          </a:ln>
-        </p:spPr>
-        <p:style>
-          <a:lnRef idx="1">
-            <a:schemeClr val="accent1"/>
-          </a:lnRef>
-          <a:fillRef idx="0">
-            <a:schemeClr val="accent1"/>
-          </a:fillRef>
-          <a:effectRef idx="0">
-            <a:schemeClr val="accent1"/>
-          </a:effectRef>
-          <a:fontRef idx="minor">
-            <a:schemeClr val="tx1"/>
-          </a:fontRef>
-        </p:style>
-      </p:cxnSp>
       <p:graphicFrame>
         <p:nvGraphicFramePr>
           <p:cNvPr id="12" name="Table 11">
@@ -4300,7 +4109,7 @@
           <p:nvPr>
             <p:extLst>
               <p:ext uri="{D42A27DB-BD31-4B8C-83A1-F6EECF244321}">
-                <p14:modId xmlns:p14="http://schemas.microsoft.com/office/powerpoint/2010/main" val="3583870941"/>
+                <p14:modId xmlns:p14="http://schemas.microsoft.com/office/powerpoint/2010/main" val="3979925751"/>
               </p:ext>
             </p:extLst>
           </p:nvPr>
@@ -4467,12 +4276,159 @@
           </a:graphicData>
         </a:graphic>
       </p:graphicFrame>
+      <p:sp>
+        <p:nvSpPr>
+          <p:cNvPr id="8" name="Oval 7">
+            <a:extLst>
+              <a:ext uri="{FF2B5EF4-FFF2-40B4-BE49-F238E27FC236}">
+                <a16:creationId xmlns:a16="http://schemas.microsoft.com/office/drawing/2014/main" id="{1E9E1983-8C88-784E-9F0E-74EAC99AC8F7}"/>
+              </a:ext>
+            </a:extLst>
+          </p:cNvPr>
+          <p:cNvSpPr/>
+          <p:nvPr/>
+        </p:nvSpPr>
+        <p:spPr>
+          <a:xfrm>
+            <a:off x="6932785" y="2271718"/>
+            <a:ext cx="741680" cy="741680"/>
+          </a:xfrm>
+          <a:prstGeom prst="ellipse">
+            <a:avLst/>
+          </a:prstGeom>
+        </p:spPr>
+        <p:style>
+          <a:lnRef idx="2">
+            <a:schemeClr val="accent1">
+              <a:shade val="50000"/>
+            </a:schemeClr>
+          </a:lnRef>
+          <a:fillRef idx="1">
+            <a:schemeClr val="accent1"/>
+          </a:fillRef>
+          <a:effectRef idx="0">
+            <a:schemeClr val="accent1"/>
+          </a:effectRef>
+          <a:fontRef idx="minor">
+            <a:schemeClr val="lt1"/>
+          </a:fontRef>
+        </p:style>
+        <p:txBody>
+          <a:bodyPr rtlCol="0" anchor="ctr"/>
+          <a:lstStyle/>
+          <a:p>
+            <a:pPr algn="ctr"/>
+            <a:r>
+              <a:rPr lang="en-US" sz="5000" dirty="0"/>
+              <a:t>C</a:t>
+            </a:r>
+          </a:p>
+        </p:txBody>
+      </p:sp>
+      <p:sp>
+        <p:nvSpPr>
+          <p:cNvPr id="9" name="Oval 8">
+            <a:extLst>
+              <a:ext uri="{FF2B5EF4-FFF2-40B4-BE49-F238E27FC236}">
+                <a16:creationId xmlns:a16="http://schemas.microsoft.com/office/drawing/2014/main" id="{EF4B1B36-8142-784A-96E1-944B1E2B88A0}"/>
+              </a:ext>
+            </a:extLst>
+          </p:cNvPr>
+          <p:cNvSpPr/>
+          <p:nvPr/>
+        </p:nvSpPr>
+        <p:spPr>
+          <a:xfrm>
+            <a:off x="4923478" y="2271718"/>
+            <a:ext cx="741680" cy="741680"/>
+          </a:xfrm>
+          <a:prstGeom prst="ellipse">
+            <a:avLst/>
+          </a:prstGeom>
+        </p:spPr>
+        <p:style>
+          <a:lnRef idx="2">
+            <a:schemeClr val="accent1">
+              <a:shade val="50000"/>
+            </a:schemeClr>
+          </a:lnRef>
+          <a:fillRef idx="1">
+            <a:schemeClr val="accent1"/>
+          </a:fillRef>
+          <a:effectRef idx="0">
+            <a:schemeClr val="accent1"/>
+          </a:effectRef>
+          <a:fontRef idx="minor">
+            <a:schemeClr val="lt1"/>
+          </a:fontRef>
+        </p:style>
+        <p:txBody>
+          <a:bodyPr rtlCol="0" anchor="ctr"/>
+          <a:lstStyle/>
+          <a:p>
+            <a:pPr algn="ctr"/>
+            <a:r>
+              <a:rPr lang="en-US" sz="5000" dirty="0"/>
+              <a:t>B</a:t>
+            </a:r>
+          </a:p>
+        </p:txBody>
+      </p:sp>
+      <p:sp>
+        <p:nvSpPr>
+          <p:cNvPr id="10" name="Oval 9">
+            <a:extLst>
+              <a:ext uri="{FF2B5EF4-FFF2-40B4-BE49-F238E27FC236}">
+                <a16:creationId xmlns:a16="http://schemas.microsoft.com/office/drawing/2014/main" id="{AA8B55E9-B028-A545-AE79-E2F0D3AD8932}"/>
+              </a:ext>
+            </a:extLst>
+          </p:cNvPr>
+          <p:cNvSpPr/>
+          <p:nvPr/>
+        </p:nvSpPr>
+        <p:spPr>
+          <a:xfrm>
+            <a:off x="3019103" y="2271718"/>
+            <a:ext cx="741680" cy="741680"/>
+          </a:xfrm>
+          <a:prstGeom prst="ellipse">
+            <a:avLst/>
+          </a:prstGeom>
+        </p:spPr>
+        <p:style>
+          <a:lnRef idx="2">
+            <a:schemeClr val="accent1">
+              <a:shade val="50000"/>
+            </a:schemeClr>
+          </a:lnRef>
+          <a:fillRef idx="1">
+            <a:schemeClr val="accent1"/>
+          </a:fillRef>
+          <a:effectRef idx="0">
+            <a:schemeClr val="accent1"/>
+          </a:effectRef>
+          <a:fontRef idx="minor">
+            <a:schemeClr val="lt1"/>
+          </a:fontRef>
+        </p:style>
+        <p:txBody>
+          <a:bodyPr rtlCol="0" anchor="ctr"/>
+          <a:lstStyle/>
+          <a:p>
+            <a:pPr algn="ctr"/>
+            <a:r>
+              <a:rPr lang="en-US" sz="5000" dirty="0"/>
+              <a:t>A</a:t>
+            </a:r>
+          </a:p>
+        </p:txBody>
+      </p:sp>
       <p:cxnSp>
         <p:nvCxnSpPr>
-          <p:cNvPr id="14" name="Straight Arrow Connector 13">
-            <a:extLst>
-              <a:ext uri="{FF2B5EF4-FFF2-40B4-BE49-F238E27FC236}">
-                <a16:creationId xmlns:a16="http://schemas.microsoft.com/office/drawing/2014/main" id="{F12C1478-C6A6-DA44-939D-3B4651E2321A}"/>
+          <p:cNvPr id="11" name="Straight Arrow Connector 10">
+            <a:extLst>
+              <a:ext uri="{FF2B5EF4-FFF2-40B4-BE49-F238E27FC236}">
+                <a16:creationId xmlns:a16="http://schemas.microsoft.com/office/drawing/2014/main" id="{5C4C9A0D-A78F-4044-8642-A8B6B4DDD645}"/>
               </a:ext>
             </a:extLst>
           </p:cNvPr>
@@ -4483,7 +4439,51 @@
         </p:nvCxnSpPr>
         <p:spPr>
           <a:xfrm flipH="1">
-            <a:off x="6832183" y="1961255"/>
+            <a:off x="3820743" y="2650803"/>
+            <a:ext cx="1023287" cy="0"/>
+          </a:xfrm>
+          <a:prstGeom prst="straightConnector1">
+            <a:avLst/>
+          </a:prstGeom>
+          <a:ln w="190500">
+            <a:solidFill>
+              <a:schemeClr val="accent4"/>
+            </a:solidFill>
+            <a:tailEnd type="triangle"/>
+          </a:ln>
+        </p:spPr>
+        <p:style>
+          <a:lnRef idx="1">
+            <a:schemeClr val="accent1"/>
+          </a:lnRef>
+          <a:fillRef idx="0">
+            <a:schemeClr val="accent1"/>
+          </a:fillRef>
+          <a:effectRef idx="0">
+            <a:schemeClr val="accent1"/>
+          </a:effectRef>
+          <a:fontRef idx="minor">
+            <a:schemeClr val="tx1"/>
+          </a:fontRef>
+        </p:style>
+      </p:cxnSp>
+      <p:cxnSp>
+        <p:nvCxnSpPr>
+          <p:cNvPr id="13" name="Straight Arrow Connector 12">
+            <a:extLst>
+              <a:ext uri="{FF2B5EF4-FFF2-40B4-BE49-F238E27FC236}">
+                <a16:creationId xmlns:a16="http://schemas.microsoft.com/office/drawing/2014/main" id="{38AF34DA-608E-6640-9B5F-6C2917882180}"/>
+              </a:ext>
+            </a:extLst>
+          </p:cNvPr>
+          <p:cNvCxnSpPr>
+            <a:cxnSpLocks/>
+          </p:cNvCxnSpPr>
+          <p:nvPr/>
+        </p:nvCxnSpPr>
+        <p:spPr>
+          <a:xfrm flipH="1">
+            <a:off x="5801943" y="2665836"/>
             <a:ext cx="1023287" cy="0"/>
           </a:xfrm>
           <a:prstGeom prst="straightConnector1">

</xml_diff>